<commit_message>
content: Revise slides about optimization
</commit_message>
<xml_diff>
--- a/source/optimization/heuristic/_static/heuristics.pptx
+++ b/source/optimization/heuristic/_static/heuristics.pptx
@@ -4312,7 +4312,7 @@
           <a:p>
             <a:r>
               <a:rPr lang="en-NO" dirty="0"/>
-              <a:t>Week 11 / Lecture 3</a:t>
+              <a:t>Optimization / Lecture 3</a:t>
             </a:r>
           </a:p>
         </p:txBody>
@@ -22238,19 +22238,6 @@
         <p:txBody>
           <a:bodyPr anchor="ctr"/>
           <a:lstStyle/>
-          <a:p>
-            <a:pPr marL="457200" indent="-457200">
-              <a:lnSpc>
-                <a:spcPct val="150000"/>
-              </a:lnSpc>
-              <a:buFont typeface="+mj-lt"/>
-              <a:buAutoNum type="arabicPeriod"/>
-            </a:pPr>
-            <a:r>
-              <a:rPr lang="en-NO" dirty="0"/>
-              <a:t>What is Optimization?</a:t>
-            </a:r>
-          </a:p>
           <a:p>
             <a:pPr marL="457200" indent="-457200">
               <a:lnSpc>

</xml_diff>